<commit_message>
Koden fra Forelesning 1
</commit_message>
<xml_diff>
--- a/Forelesning 1.pptx
+++ b/Forelesning 1.pptx
@@ -144,8 +144,8 @@
 <pc:chgInfo xmlns:a="http://schemas.openxmlformats.org/drawingml/2006/main" xmlns:r="http://schemas.openxmlformats.org/officeDocument/2006/relationships" xmlns:ac="http://schemas.microsoft.com/office/drawing/2013/main/command" xmlns:pc="http://schemas.microsoft.com/office/powerpoint/2013/main/command">
   <pc:docChgLst>
     <pc:chgData name="Ammar Haddad" userId="93eb3f186d2f468f" providerId="LiveId" clId="{8448CFBF-EB9D-4ECE-9819-23EFB2A3C22D}"/>
-    <pc:docChg chg="delSld">
-      <pc:chgData name="Ammar Haddad" userId="93eb3f186d2f468f" providerId="LiveId" clId="{8448CFBF-EB9D-4ECE-9819-23EFB2A3C22D}" dt="2021-10-20T16:25:12.968" v="6" actId="47"/>
+    <pc:docChg chg="undo custSel delSld modSld">
+      <pc:chgData name="Ammar Haddad" userId="93eb3f186d2f468f" providerId="LiveId" clId="{8448CFBF-EB9D-4ECE-9819-23EFB2A3C22D}" dt="2021-10-20T19:06:08.969" v="283" actId="20577"/>
       <pc:docMkLst>
         <pc:docMk/>
       </pc:docMkLst>
@@ -190,6 +190,21 @@
           <pc:docMk/>
           <pc:sldMk cId="191056867" sldId="293"/>
         </pc:sldMkLst>
+      </pc:sldChg>
+      <pc:sldChg chg="modSp mod">
+        <pc:chgData name="Ammar Haddad" userId="93eb3f186d2f468f" providerId="LiveId" clId="{8448CFBF-EB9D-4ECE-9819-23EFB2A3C22D}" dt="2021-10-20T19:06:08.969" v="283" actId="20577"/>
+        <pc:sldMkLst>
+          <pc:docMk/>
+          <pc:sldMk cId="3598219090" sldId="294"/>
+        </pc:sldMkLst>
+        <pc:spChg chg="mod">
+          <ac:chgData name="Ammar Haddad" userId="93eb3f186d2f468f" providerId="LiveId" clId="{8448CFBF-EB9D-4ECE-9819-23EFB2A3C22D}" dt="2021-10-20T19:06:08.969" v="283" actId="20577"/>
+          <ac:spMkLst>
+            <pc:docMk/>
+            <pc:sldMk cId="3598219090" sldId="294"/>
+            <ac:spMk id="3" creationId="{A662D049-34B3-430B-BF9D-516F3F7735BA}"/>
+          </ac:spMkLst>
+        </pc:spChg>
       </pc:sldChg>
       <pc:sldChg chg="del">
         <pc:chgData name="Ammar Haddad" userId="93eb3f186d2f468f" providerId="LiveId" clId="{8448CFBF-EB9D-4ECE-9819-23EFB2A3C22D}" dt="2021-10-20T16:25:12.437" v="5" actId="47"/>
@@ -12586,7 +12601,7 @@
         </p:spPr>
         <p:txBody>
           <a:bodyPr>
-            <a:normAutofit fontScale="55000" lnSpcReduction="20000"/>
+            <a:normAutofit fontScale="92500"/>
           </a:bodyPr>
           <a:lstStyle/>
           <a:p>
@@ -12596,15 +12611,15 @@
               </a:lnSpc>
             </a:pPr>
             <a:r>
-              <a:rPr lang="nb-NO" sz="2800" b="1" dirty="0"/>
+              <a:rPr lang="nb-NO" sz="1600" b="1" dirty="0"/>
               <a:t>Lag en </a:t>
             </a:r>
             <a:r>
-              <a:rPr lang="nb-NO" sz="2800" b="1" dirty="0" err="1"/>
+              <a:rPr lang="nb-NO" sz="1600" b="1" dirty="0" err="1"/>
               <a:t>java</a:t>
             </a:r>
             <a:r>
-              <a:rPr lang="nb-NO" sz="2800" b="1" dirty="0"/>
+              <a:rPr lang="nb-NO" sz="1600" b="1" dirty="0"/>
               <a:t> klasse for kaker, ønskede felt er «størrelse, type, pris, glutenfri eller ikke».</a:t>
             </a:r>
           </a:p>
@@ -12615,15 +12630,15 @@
               </a:lnSpc>
             </a:pPr>
             <a:r>
-              <a:rPr lang="nb-NO" sz="2800" b="1" dirty="0"/>
+              <a:rPr lang="nb-NO" sz="1600" b="1" dirty="0"/>
               <a:t>Lag en </a:t>
             </a:r>
             <a:r>
-              <a:rPr lang="nb-NO" sz="2800" b="1" dirty="0" err="1"/>
+              <a:rPr lang="nb-NO" sz="1600" b="1" dirty="0" err="1"/>
               <a:t>constructor</a:t>
             </a:r>
             <a:r>
-              <a:rPr lang="nb-NO" sz="2800" b="1" dirty="0"/>
+              <a:rPr lang="nb-NO" sz="1600" b="1" dirty="0"/>
               <a:t> men ta hensyn til at akkurat nå alle kaker vi selger er glutenfrie! Ellers så vi har mange ulike typer og størrelser og dermed priser.</a:t>
             </a:r>
           </a:p>
@@ -12634,8 +12649,8 @@
               </a:lnSpc>
             </a:pPr>
             <a:r>
-              <a:rPr lang="nb-NO" sz="2800" dirty="0"/>
-              <a:t>Lag en metode som returnere hvilken type kaken har?</a:t>
+              <a:rPr lang="nb-NO" sz="1600" dirty="0"/>
+              <a:t>1. Lag en metode som returnere hvilken pris kaken har?</a:t>
             </a:r>
           </a:p>
           <a:p>
@@ -12645,8 +12660,8 @@
               </a:lnSpc>
             </a:pPr>
             <a:r>
-              <a:rPr lang="nb-NO" sz="2800" dirty="0"/>
-              <a:t>Lag en metode som printer ut detaljene til kaken?</a:t>
+              <a:rPr lang="nb-NO" sz="1600" dirty="0"/>
+              <a:t>2. Lag en metode som gir 50% rabatt på den ene kaken fordi den skal gå ut på dato snart (Hint: pris / 2) ?</a:t>
             </a:r>
           </a:p>
           <a:p>
@@ -12656,8 +12671,8 @@
               </a:lnSpc>
             </a:pPr>
             <a:r>
-              <a:rPr lang="nb-NO" sz="2800" dirty="0"/>
-              <a:t>Lag en metode som regner ut prisen på antall kaker kunden kjøper (Hint: pris * antall)?</a:t>
+              <a:rPr lang="nb-NO" sz="1600" dirty="0"/>
+              <a:t>3. Lag en metode som regner ut prisen på antall kaker kunden kjøper?</a:t>
             </a:r>
           </a:p>
           <a:p>
@@ -12667,55 +12682,25 @@
               </a:lnSpc>
             </a:pPr>
             <a:r>
-              <a:rPr lang="nb-NO" sz="2800" dirty="0"/>
-              <a:t>Lag en metode som gir 50% rabatt på den ene kaken fordi den skal gå ut på dato snart (Hint: pris / 2) ?</a:t>
-            </a:r>
-          </a:p>
-          <a:p>
-            <a:pPr algn="l">
-              <a:lnSpc>
-                <a:spcPct val="150000"/>
-              </a:lnSpc>
-            </a:pPr>
-            <a:r>
-              <a:rPr lang="nb-NO" sz="2800" dirty="0"/>
-              <a:t>Lag en metode som sjekker om typen er </a:t>
-            </a:r>
-            <a:r>
-              <a:rPr lang="nb-NO" sz="2800" dirty="0" err="1"/>
+              <a:rPr lang="nb-NO" sz="1600" dirty="0"/>
+              <a:t>4. Lag en metode som sjekker om typen er </a:t>
+            </a:r>
+            <a:r>
+              <a:rPr lang="nb-NO" sz="1600" dirty="0" err="1"/>
               <a:t>gullrotkake</a:t>
             </a:r>
             <a:r>
-              <a:rPr lang="nb-NO" sz="2800" dirty="0"/>
+              <a:rPr lang="nb-NO" sz="1600" dirty="0"/>
               <a:t>, hvis ja </a:t>
             </a:r>
             <a:r>
-              <a:rPr lang="nb-NO" sz="2800" dirty="0" err="1"/>
+              <a:rPr lang="nb-NO" sz="1600" dirty="0" err="1"/>
               <a:t>print</a:t>
             </a:r>
             <a:r>
-              <a:rPr lang="nb-NO" sz="2800" dirty="0"/>
-              <a:t> «Jeg vil kjøpe», hvis ikke «vil ikke, takk!»</a:t>
-            </a:r>
-          </a:p>
-          <a:p>
-            <a:pPr algn="l">
-              <a:lnSpc>
-                <a:spcPct val="150000"/>
-              </a:lnSpc>
-            </a:pPr>
-            <a:r>
-              <a:rPr lang="nb-NO" sz="2800" dirty="0"/>
-              <a:t> </a:t>
-            </a:r>
-          </a:p>
-          <a:p>
-            <a:pPr algn="l">
-              <a:lnSpc>
-                <a:spcPct val="150000"/>
-              </a:lnSpc>
-            </a:pPr>
-            <a:endParaRPr lang="nb-NO" sz="3000" dirty="0"/>
+              <a:rPr lang="nb-NO" sz="1600" dirty="0"/>
+              <a:t> «Jeg vil kjøpe», hvis ikke «Nei, takk!».</a:t>
+            </a:r>
           </a:p>
         </p:txBody>
       </p:sp>

</xml_diff>